<commit_message>
Adding some datasets + a basic workflow for mapping
</commit_message>
<xml_diff>
--- a/Overal_data_curation.pptx
+++ b/Overal_data_curation.pptx
@@ -104,6 +104,11 @@
       </a:defRPr>
     </a:lvl9pPr>
   </p:defaultTextStyle>
+  <p:extLst>
+    <p:ext uri="{EFAFB233-063F-42B5-8137-9DF3F51BA10A}">
+      <p15:sldGuideLst xmlns:p15="http://schemas.microsoft.com/office/powerpoint/2012/main"/>
+    </p:ext>
+  </p:extLst>
 </p:presentation>
 </file>
 
@@ -254,7 +259,7 @@
           <a:p>
             <a:fld id="{F3787539-ED79-4958-8487-251D7A27B661}" type="datetimeFigureOut">
               <a:rPr lang="en-US" smtClean="0"/>
-              <a:t>10/14/2021</a:t>
+              <a:t>10/18/2021</a:t>
             </a:fld>
             <a:endParaRPr lang="en-US"/>
           </a:p>
@@ -452,7 +457,7 @@
           <a:p>
             <a:fld id="{F3787539-ED79-4958-8487-251D7A27B661}" type="datetimeFigureOut">
               <a:rPr lang="en-US" smtClean="0"/>
-              <a:t>10/14/2021</a:t>
+              <a:t>10/18/2021</a:t>
             </a:fld>
             <a:endParaRPr lang="en-US"/>
           </a:p>
@@ -660,7 +665,7 @@
           <a:p>
             <a:fld id="{F3787539-ED79-4958-8487-251D7A27B661}" type="datetimeFigureOut">
               <a:rPr lang="en-US" smtClean="0"/>
-              <a:t>10/14/2021</a:t>
+              <a:t>10/18/2021</a:t>
             </a:fld>
             <a:endParaRPr lang="en-US"/>
           </a:p>
@@ -858,7 +863,7 @@
           <a:p>
             <a:fld id="{F3787539-ED79-4958-8487-251D7A27B661}" type="datetimeFigureOut">
               <a:rPr lang="en-US" smtClean="0"/>
-              <a:t>10/14/2021</a:t>
+              <a:t>10/18/2021</a:t>
             </a:fld>
             <a:endParaRPr lang="en-US"/>
           </a:p>
@@ -1133,7 +1138,7 @@
           <a:p>
             <a:fld id="{F3787539-ED79-4958-8487-251D7A27B661}" type="datetimeFigureOut">
               <a:rPr lang="en-US" smtClean="0"/>
-              <a:t>10/14/2021</a:t>
+              <a:t>10/18/2021</a:t>
             </a:fld>
             <a:endParaRPr lang="en-US"/>
           </a:p>
@@ -1398,7 +1403,7 @@
           <a:p>
             <a:fld id="{F3787539-ED79-4958-8487-251D7A27B661}" type="datetimeFigureOut">
               <a:rPr lang="en-US" smtClean="0"/>
-              <a:t>10/14/2021</a:t>
+              <a:t>10/18/2021</a:t>
             </a:fld>
             <a:endParaRPr lang="en-US"/>
           </a:p>
@@ -1810,7 +1815,7 @@
           <a:p>
             <a:fld id="{F3787539-ED79-4958-8487-251D7A27B661}" type="datetimeFigureOut">
               <a:rPr lang="en-US" smtClean="0"/>
-              <a:t>10/14/2021</a:t>
+              <a:t>10/18/2021</a:t>
             </a:fld>
             <a:endParaRPr lang="en-US"/>
           </a:p>
@@ -1951,7 +1956,7 @@
           <a:p>
             <a:fld id="{F3787539-ED79-4958-8487-251D7A27B661}" type="datetimeFigureOut">
               <a:rPr lang="en-US" smtClean="0"/>
-              <a:t>10/14/2021</a:t>
+              <a:t>10/18/2021</a:t>
             </a:fld>
             <a:endParaRPr lang="en-US"/>
           </a:p>
@@ -2064,7 +2069,7 @@
           <a:p>
             <a:fld id="{F3787539-ED79-4958-8487-251D7A27B661}" type="datetimeFigureOut">
               <a:rPr lang="en-US" smtClean="0"/>
-              <a:t>10/14/2021</a:t>
+              <a:t>10/18/2021</a:t>
             </a:fld>
             <a:endParaRPr lang="en-US"/>
           </a:p>
@@ -2375,7 +2380,7 @@
           <a:p>
             <a:fld id="{F3787539-ED79-4958-8487-251D7A27B661}" type="datetimeFigureOut">
               <a:rPr lang="en-US" smtClean="0"/>
-              <a:t>10/14/2021</a:t>
+              <a:t>10/18/2021</a:t>
             </a:fld>
             <a:endParaRPr lang="en-US"/>
           </a:p>
@@ -2663,7 +2668,7 @@
           <a:p>
             <a:fld id="{F3787539-ED79-4958-8487-251D7A27B661}" type="datetimeFigureOut">
               <a:rPr lang="en-US" smtClean="0"/>
-              <a:t>10/14/2021</a:t>
+              <a:t>10/18/2021</a:t>
             </a:fld>
             <a:endParaRPr lang="en-US"/>
           </a:p>
@@ -2904,7 +2909,7 @@
           <a:p>
             <a:fld id="{F3787539-ED79-4958-8487-251D7A27B661}" type="datetimeFigureOut">
               <a:rPr lang="en-US" smtClean="0"/>
-              <a:t>10/14/2021</a:t>
+              <a:t>10/18/2021</a:t>
             </a:fld>
             <a:endParaRPr lang="en-US"/>
           </a:p>
@@ -4318,21 +4323,8 @@
                   <a:schemeClr val="tx1"/>
                 </a:solidFill>
               </a:rPr>
-              <a:t>Display the spectra. Eventually calculate LMA with Shawn’s model to detect </a:t>
-            </a:r>
-            <a:r>
-              <a:rPr lang="en-US" sz="1200" dirty="0" err="1">
-                <a:solidFill>
-                  <a:schemeClr val="tx1"/>
-                </a:solidFill>
-              </a:rPr>
-              <a:t>weirdnesses</a:t>
-            </a:r>
-            <a:endParaRPr lang="en-US" sz="1200" dirty="0">
-              <a:solidFill>
-                <a:schemeClr val="tx1"/>
-              </a:solidFill>
-            </a:endParaRPr>
+              <a:t>Display the spectra. Eventually calculate LMA with Shawn’s model to detect weirdness</a:t>
+            </a:r>
           </a:p>
         </p:txBody>
       </p:sp>
@@ -4711,7 +4703,7 @@
                   <a:schemeClr val="tx1"/>
                 </a:solidFill>
               </a:rPr>
-              <a:t>Author, email, country, </a:t>
+              <a:t>Authors, Acknowledgment, </a:t>
             </a:r>
             <a:r>
               <a:rPr lang="en-US" sz="1200" dirty="0" err="1">
@@ -4719,7 +4711,7 @@
                   <a:schemeClr val="tx1"/>
                 </a:solidFill>
               </a:rPr>
-              <a:t>lat</a:t>
+              <a:t>Dataset_DOI</a:t>
             </a:r>
             <a:r>
               <a:rPr lang="en-US" sz="1200" dirty="0">
@@ -4727,7 +4719,23 @@
                   <a:schemeClr val="tx1"/>
                 </a:solidFill>
               </a:rPr>
-              <a:t>, long, environment, dataset DOI, pub reference </a:t>
+              <a:t>, </a:t>
+            </a:r>
+            <a:r>
+              <a:rPr lang="en-US" sz="1200" dirty="0" err="1">
+                <a:solidFill>
+                  <a:schemeClr val="tx1"/>
+                </a:solidFill>
+              </a:rPr>
+              <a:t>Publication_Citation</a:t>
+            </a:r>
+            <a:r>
+              <a:rPr lang="en-US" sz="1200" dirty="0">
+                <a:solidFill>
+                  <a:schemeClr val="tx1"/>
+                </a:solidFill>
+              </a:rPr>
+              <a:t>, Email, Lat, Long, Elevation</a:t>
             </a:r>
           </a:p>
         </p:txBody>
@@ -4896,6 +4904,49 @@
           </a:p>
         </p:txBody>
       </p:sp>
+      <p:cxnSp>
+        <p:nvCxnSpPr>
+          <p:cNvPr id="23" name="Straight Arrow Connector 22">
+            <a:extLst>
+              <a:ext uri="{FF2B5EF4-FFF2-40B4-BE49-F238E27FC236}">
+                <a16:creationId xmlns:a16="http://schemas.microsoft.com/office/drawing/2014/main" id="{E1A01835-6CC6-4963-9F6D-C409E09E7CB8}"/>
+              </a:ext>
+            </a:extLst>
+          </p:cNvPr>
+          <p:cNvCxnSpPr>
+            <a:cxnSpLocks/>
+            <a:stCxn id="32" idx="2"/>
+            <a:endCxn id="8" idx="0"/>
+          </p:cNvCxnSpPr>
+          <p:nvPr/>
+        </p:nvCxnSpPr>
+        <p:spPr>
+          <a:xfrm flipH="1">
+            <a:off x="2685008" y="3230418"/>
+            <a:ext cx="1" cy="393470"/>
+          </a:xfrm>
+          <a:prstGeom prst="straightConnector1">
+            <a:avLst/>
+          </a:prstGeom>
+          <a:ln>
+            <a:tailEnd type="triangle"/>
+          </a:ln>
+        </p:spPr>
+        <p:style>
+          <a:lnRef idx="1">
+            <a:schemeClr val="accent1"/>
+          </a:lnRef>
+          <a:fillRef idx="0">
+            <a:schemeClr val="accent1"/>
+          </a:fillRef>
+          <a:effectRef idx="0">
+            <a:schemeClr val="accent1"/>
+          </a:effectRef>
+          <a:fontRef idx="minor">
+            <a:schemeClr val="tx1"/>
+          </a:fontRef>
+        </p:style>
+      </p:cxnSp>
     </p:spTree>
     <p:extLst>
       <p:ext uri="{BB962C8B-B14F-4D97-AF65-F5344CB8AC3E}">

</xml_diff>

<commit_message>
Updating data curation pdf
</commit_message>
<xml_diff>
--- a/Overal_data_curation.pptx
+++ b/Overal_data_curation.pptx
@@ -259,7 +259,7 @@
           <a:p>
             <a:fld id="{F3787539-ED79-4958-8487-251D7A27B661}" type="datetimeFigureOut">
               <a:rPr lang="en-US" smtClean="0"/>
-              <a:t>10/18/2021</a:t>
+              <a:t>10/11/2022</a:t>
             </a:fld>
             <a:endParaRPr lang="en-US"/>
           </a:p>
@@ -313,7 +313,7 @@
           <a:p>
             <a:fld id="{2CCD9D60-7FA9-4A2D-ADCB-5ABA9EAAA828}" type="slidenum">
               <a:rPr lang="en-US" smtClean="0"/>
-              <a:t>‹#›</a:t>
+              <a:t>‹N°›</a:t>
             </a:fld>
             <a:endParaRPr lang="en-US"/>
           </a:p>
@@ -457,7 +457,7 @@
           <a:p>
             <a:fld id="{F3787539-ED79-4958-8487-251D7A27B661}" type="datetimeFigureOut">
               <a:rPr lang="en-US" smtClean="0"/>
-              <a:t>10/18/2021</a:t>
+              <a:t>10/11/2022</a:t>
             </a:fld>
             <a:endParaRPr lang="en-US"/>
           </a:p>
@@ -511,7 +511,7 @@
           <a:p>
             <a:fld id="{2CCD9D60-7FA9-4A2D-ADCB-5ABA9EAAA828}" type="slidenum">
               <a:rPr lang="en-US" smtClean="0"/>
-              <a:t>‹#›</a:t>
+              <a:t>‹N°›</a:t>
             </a:fld>
             <a:endParaRPr lang="en-US"/>
           </a:p>
@@ -665,7 +665,7 @@
           <a:p>
             <a:fld id="{F3787539-ED79-4958-8487-251D7A27B661}" type="datetimeFigureOut">
               <a:rPr lang="en-US" smtClean="0"/>
-              <a:t>10/18/2021</a:t>
+              <a:t>10/11/2022</a:t>
             </a:fld>
             <a:endParaRPr lang="en-US"/>
           </a:p>
@@ -719,7 +719,7 @@
           <a:p>
             <a:fld id="{2CCD9D60-7FA9-4A2D-ADCB-5ABA9EAAA828}" type="slidenum">
               <a:rPr lang="en-US" smtClean="0"/>
-              <a:t>‹#›</a:t>
+              <a:t>‹N°›</a:t>
             </a:fld>
             <a:endParaRPr lang="en-US"/>
           </a:p>
@@ -863,7 +863,7 @@
           <a:p>
             <a:fld id="{F3787539-ED79-4958-8487-251D7A27B661}" type="datetimeFigureOut">
               <a:rPr lang="en-US" smtClean="0"/>
-              <a:t>10/18/2021</a:t>
+              <a:t>10/11/2022</a:t>
             </a:fld>
             <a:endParaRPr lang="en-US"/>
           </a:p>
@@ -917,7 +917,7 @@
           <a:p>
             <a:fld id="{2CCD9D60-7FA9-4A2D-ADCB-5ABA9EAAA828}" type="slidenum">
               <a:rPr lang="en-US" smtClean="0"/>
-              <a:t>‹#›</a:t>
+              <a:t>‹N°›</a:t>
             </a:fld>
             <a:endParaRPr lang="en-US"/>
           </a:p>
@@ -1138,7 +1138,7 @@
           <a:p>
             <a:fld id="{F3787539-ED79-4958-8487-251D7A27B661}" type="datetimeFigureOut">
               <a:rPr lang="en-US" smtClean="0"/>
-              <a:t>10/18/2021</a:t>
+              <a:t>10/11/2022</a:t>
             </a:fld>
             <a:endParaRPr lang="en-US"/>
           </a:p>
@@ -1192,7 +1192,7 @@
           <a:p>
             <a:fld id="{2CCD9D60-7FA9-4A2D-ADCB-5ABA9EAAA828}" type="slidenum">
               <a:rPr lang="en-US" smtClean="0"/>
-              <a:t>‹#›</a:t>
+              <a:t>‹N°›</a:t>
             </a:fld>
             <a:endParaRPr lang="en-US"/>
           </a:p>
@@ -1403,7 +1403,7 @@
           <a:p>
             <a:fld id="{F3787539-ED79-4958-8487-251D7A27B661}" type="datetimeFigureOut">
               <a:rPr lang="en-US" smtClean="0"/>
-              <a:t>10/18/2021</a:t>
+              <a:t>10/11/2022</a:t>
             </a:fld>
             <a:endParaRPr lang="en-US"/>
           </a:p>
@@ -1457,7 +1457,7 @@
           <a:p>
             <a:fld id="{2CCD9D60-7FA9-4A2D-ADCB-5ABA9EAAA828}" type="slidenum">
               <a:rPr lang="en-US" smtClean="0"/>
-              <a:t>‹#›</a:t>
+              <a:t>‹N°›</a:t>
             </a:fld>
             <a:endParaRPr lang="en-US"/>
           </a:p>
@@ -1815,7 +1815,7 @@
           <a:p>
             <a:fld id="{F3787539-ED79-4958-8487-251D7A27B661}" type="datetimeFigureOut">
               <a:rPr lang="en-US" smtClean="0"/>
-              <a:t>10/18/2021</a:t>
+              <a:t>10/11/2022</a:t>
             </a:fld>
             <a:endParaRPr lang="en-US"/>
           </a:p>
@@ -1869,7 +1869,7 @@
           <a:p>
             <a:fld id="{2CCD9D60-7FA9-4A2D-ADCB-5ABA9EAAA828}" type="slidenum">
               <a:rPr lang="en-US" smtClean="0"/>
-              <a:t>‹#›</a:t>
+              <a:t>‹N°›</a:t>
             </a:fld>
             <a:endParaRPr lang="en-US"/>
           </a:p>
@@ -1956,7 +1956,7 @@
           <a:p>
             <a:fld id="{F3787539-ED79-4958-8487-251D7A27B661}" type="datetimeFigureOut">
               <a:rPr lang="en-US" smtClean="0"/>
-              <a:t>10/18/2021</a:t>
+              <a:t>10/11/2022</a:t>
             </a:fld>
             <a:endParaRPr lang="en-US"/>
           </a:p>
@@ -2010,7 +2010,7 @@
           <a:p>
             <a:fld id="{2CCD9D60-7FA9-4A2D-ADCB-5ABA9EAAA828}" type="slidenum">
               <a:rPr lang="en-US" smtClean="0"/>
-              <a:t>‹#›</a:t>
+              <a:t>‹N°›</a:t>
             </a:fld>
             <a:endParaRPr lang="en-US"/>
           </a:p>
@@ -2069,7 +2069,7 @@
           <a:p>
             <a:fld id="{F3787539-ED79-4958-8487-251D7A27B661}" type="datetimeFigureOut">
               <a:rPr lang="en-US" smtClean="0"/>
-              <a:t>10/18/2021</a:t>
+              <a:t>10/11/2022</a:t>
             </a:fld>
             <a:endParaRPr lang="en-US"/>
           </a:p>
@@ -2123,7 +2123,7 @@
           <a:p>
             <a:fld id="{2CCD9D60-7FA9-4A2D-ADCB-5ABA9EAAA828}" type="slidenum">
               <a:rPr lang="en-US" smtClean="0"/>
-              <a:t>‹#›</a:t>
+              <a:t>‹N°›</a:t>
             </a:fld>
             <a:endParaRPr lang="en-US"/>
           </a:p>
@@ -2380,7 +2380,7 @@
           <a:p>
             <a:fld id="{F3787539-ED79-4958-8487-251D7A27B661}" type="datetimeFigureOut">
               <a:rPr lang="en-US" smtClean="0"/>
-              <a:t>10/18/2021</a:t>
+              <a:t>10/11/2022</a:t>
             </a:fld>
             <a:endParaRPr lang="en-US"/>
           </a:p>
@@ -2434,7 +2434,7 @@
           <a:p>
             <a:fld id="{2CCD9D60-7FA9-4A2D-ADCB-5ABA9EAAA828}" type="slidenum">
               <a:rPr lang="en-US" smtClean="0"/>
-              <a:t>‹#›</a:t>
+              <a:t>‹N°›</a:t>
             </a:fld>
             <a:endParaRPr lang="en-US"/>
           </a:p>
@@ -2668,7 +2668,7 @@
           <a:p>
             <a:fld id="{F3787539-ED79-4958-8487-251D7A27B661}" type="datetimeFigureOut">
               <a:rPr lang="en-US" smtClean="0"/>
-              <a:t>10/18/2021</a:t>
+              <a:t>10/11/2022</a:t>
             </a:fld>
             <a:endParaRPr lang="en-US"/>
           </a:p>
@@ -2722,7 +2722,7 @@
           <a:p>
             <a:fld id="{2CCD9D60-7FA9-4A2D-ADCB-5ABA9EAAA828}" type="slidenum">
               <a:rPr lang="en-US" smtClean="0"/>
-              <a:t>‹#›</a:t>
+              <a:t>‹N°›</a:t>
             </a:fld>
             <a:endParaRPr lang="en-US"/>
           </a:p>
@@ -2909,7 +2909,7 @@
           <a:p>
             <a:fld id="{F3787539-ED79-4958-8487-251D7A27B661}" type="datetimeFigureOut">
               <a:rPr lang="en-US" smtClean="0"/>
-              <a:t>10/18/2021</a:t>
+              <a:t>10/11/2022</a:t>
             </a:fld>
             <a:endParaRPr lang="en-US"/>
           </a:p>
@@ -2999,7 +2999,7 @@
           <a:p>
             <a:fld id="{2CCD9D60-7FA9-4A2D-ADCB-5ABA9EAAA828}" type="slidenum">
               <a:rPr lang="en-US" smtClean="0"/>
-              <a:t>‹#›</a:t>
+              <a:t>‹N°›</a:t>
             </a:fld>
             <a:endParaRPr lang="en-US"/>
           </a:p>
@@ -3442,8 +3442,8 @@
         </p:nvCxnSpPr>
         <p:spPr>
           <a:xfrm flipH="1">
-            <a:off x="2685010" y="1612208"/>
-            <a:ext cx="1" cy="470130"/>
+            <a:off x="2685010" y="1437638"/>
+            <a:ext cx="1" cy="644700"/>
           </a:xfrm>
           <a:prstGeom prst="straightConnector1">
             <a:avLst/>
@@ -3621,55 +3621,6 @@
       </p:sp>
       <p:sp>
         <p:nvSpPr>
-          <p:cNvPr id="15" name="Rectangle 14">
-            <a:extLst>
-              <a:ext uri="{FF2B5EF4-FFF2-40B4-BE49-F238E27FC236}">
-                <a16:creationId xmlns:a16="http://schemas.microsoft.com/office/drawing/2014/main" id="{22991EDC-CE67-457F-8670-D7A2F7984362}"/>
-              </a:ext>
-            </a:extLst>
-          </p:cNvPr>
-          <p:cNvSpPr/>
-          <p:nvPr/>
-        </p:nvSpPr>
-        <p:spPr>
-          <a:xfrm>
-            <a:off x="6453447" y="2222270"/>
-            <a:ext cx="3053542" cy="647468"/>
-          </a:xfrm>
-          <a:prstGeom prst="rect">
-            <a:avLst/>
-          </a:prstGeom>
-        </p:spPr>
-        <p:style>
-          <a:lnRef idx="2">
-            <a:schemeClr val="accent1">
-              <a:shade val="50000"/>
-            </a:schemeClr>
-          </a:lnRef>
-          <a:fillRef idx="1">
-            <a:schemeClr val="accent1"/>
-          </a:fillRef>
-          <a:effectRef idx="0">
-            <a:schemeClr val="accent1"/>
-          </a:effectRef>
-          <a:fontRef idx="minor">
-            <a:schemeClr val="lt1"/>
-          </a:fontRef>
-        </p:style>
-        <p:txBody>
-          <a:bodyPr rtlCol="0" anchor="ctr"/>
-          <a:lstStyle/>
-          <a:p>
-            <a:pPr algn="ctr"/>
-            <a:r>
-              <a:rPr lang="en-US" dirty="0"/>
-              <a:t>QA QC the spectra</a:t>
-            </a:r>
-          </a:p>
-        </p:txBody>
-      </p:sp>
-      <p:sp>
-        <p:nvSpPr>
           <p:cNvPr id="16" name="Rectangle 15">
             <a:extLst>
               <a:ext uri="{FF2B5EF4-FFF2-40B4-BE49-F238E27FC236}">
@@ -3732,7 +3683,7 @@
         <p:spPr>
           <a:xfrm>
             <a:off x="972589" y="934258"/>
-            <a:ext cx="3424843" cy="677950"/>
+            <a:ext cx="3424843" cy="503380"/>
           </a:xfrm>
           <a:prstGeom prst="rect">
             <a:avLst/>
@@ -3764,111 +3715,53 @@
           <a:bodyPr rtlCol="0" anchor="ctr"/>
           <a:lstStyle/>
           <a:p>
-            <a:pPr algn="ctr"/>
-            <a:r>
-              <a:rPr lang="en-US" sz="1200" dirty="0">
+            <a:pPr marL="171450" indent="-171450">
+              <a:buFont typeface="Arial" panose="020B0604020202020204" pitchFamily="34" charset="0"/>
+              <a:buChar char="•"/>
+            </a:pPr>
+            <a:r>
+              <a:rPr lang="pt-BR" sz="1200" dirty="0">
                 <a:solidFill>
                   <a:schemeClr val="tx1"/>
                 </a:solidFill>
               </a:rPr>
-              <a:t>Create a </a:t>
-            </a:r>
-            <a:r>
-              <a:rPr lang="en-US" sz="1200" dirty="0" err="1">
-                <a:solidFill>
-                  <a:schemeClr val="tx1"/>
-                </a:solidFill>
-              </a:rPr>
-              <a:t>data.frame</a:t>
-            </a:r>
-            <a:r>
-              <a:rPr lang="en-US" sz="1200" dirty="0">
-                <a:solidFill>
-                  <a:schemeClr val="tx1"/>
-                </a:solidFill>
-              </a:rPr>
-              <a:t> with ESS format columns</a:t>
-            </a:r>
-          </a:p>
-          <a:p>
-            <a:pPr algn="ctr"/>
-            <a:r>
-              <a:rPr lang="en-US" sz="1200" dirty="0" err="1">
-                <a:solidFill>
-                  <a:schemeClr val="tx1"/>
-                </a:solidFill>
-              </a:rPr>
-              <a:t>SampleID</a:t>
-            </a:r>
-            <a:r>
-              <a:rPr lang="en-US" sz="1200" dirty="0">
-                <a:solidFill>
-                  <a:schemeClr val="tx1"/>
-                </a:solidFill>
-              </a:rPr>
-              <a:t>, </a:t>
-            </a:r>
-            <a:r>
-              <a:rPr lang="en-US" sz="1200" dirty="0" err="1">
-                <a:solidFill>
-                  <a:schemeClr val="tx1"/>
-                </a:solidFill>
-              </a:rPr>
-              <a:t>Obs</a:t>
-            </a:r>
-            <a:r>
-              <a:rPr lang="en-US" sz="1200" dirty="0">
-                <a:solidFill>
-                  <a:schemeClr val="tx1"/>
-                </a:solidFill>
-              </a:rPr>
-              <a:t>, A, Ci, CO2s, </a:t>
-            </a:r>
-            <a:r>
-              <a:rPr lang="en-US" sz="1200" dirty="0" err="1">
-                <a:solidFill>
-                  <a:schemeClr val="tx1"/>
-                </a:solidFill>
-              </a:rPr>
-              <a:t>gsw</a:t>
-            </a:r>
-            <a:r>
-              <a:rPr lang="en-US" sz="1200" dirty="0">
-                <a:solidFill>
-                  <a:schemeClr val="tx1"/>
-                </a:solidFill>
-              </a:rPr>
-              <a:t>, </a:t>
-            </a:r>
-            <a:r>
-              <a:rPr lang="en-US" sz="1200" dirty="0" err="1">
-                <a:solidFill>
-                  <a:schemeClr val="tx1"/>
-                </a:solidFill>
-              </a:rPr>
-              <a:t>Patm</a:t>
-            </a:r>
-            <a:r>
-              <a:rPr lang="en-US" sz="1200" dirty="0">
-                <a:solidFill>
-                  <a:schemeClr val="tx1"/>
-                </a:solidFill>
-              </a:rPr>
-              <a:t>, Qin, RHs, </a:t>
-            </a:r>
-            <a:r>
-              <a:rPr lang="en-US" sz="1200" dirty="0" err="1">
-                <a:solidFill>
-                  <a:schemeClr val="tx1"/>
-                </a:solidFill>
-              </a:rPr>
-              <a:t>Tleaf</a:t>
+              <a:t>0_Import_transform_original_ACi_data.R</a:t>
             </a:r>
             <a:endParaRPr lang="en-US" sz="1200" dirty="0">
               <a:solidFill>
                 <a:schemeClr val="tx1"/>
               </a:solidFill>
             </a:endParaRPr>
+          </a:p>
+          <a:p>
+            <a:pPr marL="171450" indent="-171450">
+              <a:buFont typeface="Arial" panose="020B0604020202020204" pitchFamily="34" charset="0"/>
+              <a:buChar char="•"/>
+            </a:pPr>
+            <a:r>
+              <a:rPr lang="en-US" sz="1200" dirty="0">
+                <a:solidFill>
+                  <a:schemeClr val="tx1"/>
+                </a:solidFill>
+              </a:rPr>
+              <a:t>Create a </a:t>
+            </a:r>
+            <a:r>
+              <a:rPr lang="en-US" sz="1200" dirty="0" err="1">
+                <a:solidFill>
+                  <a:schemeClr val="tx1"/>
+                </a:solidFill>
+              </a:rPr>
+              <a:t>data.frame</a:t>
+            </a:r>
+            <a:r>
+              <a:rPr lang="en-US" sz="1200" dirty="0">
+                <a:solidFill>
+                  <a:schemeClr val="tx1"/>
+                </a:solidFill>
+              </a:rPr>
+              <a:t> with ESS format columns</a:t>
+            </a:r>
           </a:p>
         </p:txBody>
       </p:sp>
@@ -3919,7 +3812,24 @@
           <a:bodyPr rtlCol="0" anchor="ctr"/>
           <a:lstStyle/>
           <a:p>
-            <a:pPr algn="ctr"/>
+            <a:pPr marL="171450" indent="-171450">
+              <a:buFont typeface="Arial" panose="020B0604020202020204" pitchFamily="34" charset="0"/>
+              <a:buChar char="•"/>
+            </a:pPr>
+            <a:r>
+              <a:rPr lang="en-US" sz="1200" dirty="0">
+                <a:solidFill>
+                  <a:schemeClr val="tx1"/>
+                </a:solidFill>
+              </a:rPr>
+              <a:t>1_QaQc_curated_Aci.R</a:t>
+            </a:r>
+          </a:p>
+          <a:p>
+            <a:pPr marL="171450" indent="-171450">
+              <a:buFont typeface="Arial" panose="020B0604020202020204" pitchFamily="34" charset="0"/>
+              <a:buChar char="•"/>
+            </a:pPr>
             <a:r>
               <a:rPr lang="en-US" sz="1200" dirty="0">
                 <a:solidFill>
@@ -3978,34 +3888,24 @@
           <a:bodyPr rtlCol="0" anchor="ctr"/>
           <a:lstStyle/>
           <a:p>
-            <a:pPr algn="ctr"/>
+            <a:pPr marL="171450" indent="-171450">
+              <a:buFont typeface="Arial" panose="020B0604020202020204" pitchFamily="34" charset="0"/>
+              <a:buChar char="•"/>
+            </a:pPr>
             <a:r>
               <a:rPr lang="en-US" sz="1200" dirty="0">
                 <a:solidFill>
                   <a:schemeClr val="tx1"/>
                 </a:solidFill>
               </a:rPr>
-              <a:t>Fitting of the curves using the </a:t>
-            </a:r>
-            <a:r>
-              <a:rPr lang="en-US" sz="1200" dirty="0" err="1">
-                <a:solidFill>
-                  <a:schemeClr val="tx1"/>
-                </a:solidFill>
-              </a:rPr>
-              <a:t>FvCB</a:t>
-            </a:r>
-            <a:r>
-              <a:rPr lang="en-US" sz="1200" dirty="0">
-                <a:solidFill>
-                  <a:schemeClr val="tx1"/>
-                </a:solidFill>
-              </a:rPr>
-              <a:t> model and parametrization from CLM4.5.</a:t>
-            </a:r>
-          </a:p>
-          <a:p>
-            <a:pPr algn="ctr"/>
+              <a:t>2_Fit_Aci.R</a:t>
+            </a:r>
+          </a:p>
+          <a:p>
+            <a:pPr marL="171450" indent="-171450">
+              <a:buFont typeface="Arial" panose="020B0604020202020204" pitchFamily="34" charset="0"/>
+              <a:buChar char="•"/>
+            </a:pPr>
             <a:r>
               <a:rPr lang="en-US" sz="1200" dirty="0">
                 <a:solidFill>
@@ -4028,112 +3928,8 @@
                   <a:schemeClr val="tx1"/>
                 </a:solidFill>
               </a:rPr>
-              <a:t> with:</a:t>
-            </a:r>
-          </a:p>
-          <a:p>
-            <a:pPr algn="ctr"/>
-            <a:r>
-              <a:rPr lang="en-US" sz="1200" dirty="0" err="1">
-                <a:solidFill>
-                  <a:schemeClr val="tx1"/>
-                </a:solidFill>
-              </a:rPr>
-              <a:t>SampleID</a:t>
-            </a:r>
-            <a:r>
-              <a:rPr lang="en-US" sz="1200" dirty="0">
-                <a:solidFill>
-                  <a:schemeClr val="tx1"/>
-                </a:solidFill>
-              </a:rPr>
-              <a:t>, </a:t>
-            </a:r>
-            <a:r>
-              <a:rPr lang="en-US" sz="1200" dirty="0" err="1">
-                <a:solidFill>
-                  <a:schemeClr val="tx1"/>
-                </a:solidFill>
-              </a:rPr>
-              <a:t>Vcmax</a:t>
-            </a:r>
-            <a:r>
-              <a:rPr lang="en-US" sz="1200" dirty="0">
-                <a:solidFill>
-                  <a:schemeClr val="tx1"/>
-                </a:solidFill>
-              </a:rPr>
-              <a:t>, </a:t>
-            </a:r>
-            <a:r>
-              <a:rPr lang="en-US" sz="1200" dirty="0" err="1">
-                <a:solidFill>
-                  <a:schemeClr val="tx1"/>
-                </a:solidFill>
-              </a:rPr>
-              <a:t>Jmax</a:t>
-            </a:r>
-            <a:r>
-              <a:rPr lang="en-US" sz="1200" dirty="0">
-                <a:solidFill>
-                  <a:schemeClr val="tx1"/>
-                </a:solidFill>
-              </a:rPr>
-              <a:t>, </a:t>
-            </a:r>
-            <a:r>
-              <a:rPr lang="en-US" sz="1200" dirty="0" err="1">
-                <a:solidFill>
-                  <a:schemeClr val="tx1"/>
-                </a:solidFill>
-              </a:rPr>
-              <a:t>Tp</a:t>
-            </a:r>
-            <a:r>
-              <a:rPr lang="en-US" sz="1200" dirty="0">
-                <a:solidFill>
-                  <a:schemeClr val="tx1"/>
-                </a:solidFill>
-              </a:rPr>
-              <a:t>, </a:t>
-            </a:r>
-            <a:r>
-              <a:rPr lang="en-US" sz="1200" dirty="0" err="1">
-                <a:solidFill>
-                  <a:schemeClr val="tx1"/>
-                </a:solidFill>
-              </a:rPr>
-              <a:t>Rday</a:t>
-            </a:r>
-            <a:r>
-              <a:rPr lang="en-US" sz="1200" dirty="0">
-                <a:solidFill>
-                  <a:schemeClr val="tx1"/>
-                </a:solidFill>
-              </a:rPr>
-              <a:t>, Vcmax25, Jmax25, Tp25,Rday25, </a:t>
-            </a:r>
-            <a:r>
-              <a:rPr lang="en-US" sz="1200" dirty="0" err="1">
-                <a:solidFill>
-                  <a:schemeClr val="tx1"/>
-                </a:solidFill>
-              </a:rPr>
-              <a:t>Tleaf</a:t>
-            </a:r>
-            <a:endParaRPr lang="en-US" sz="1200" dirty="0">
-              <a:solidFill>
-                <a:schemeClr val="tx1"/>
-              </a:solidFill>
-            </a:endParaRPr>
-          </a:p>
-          <a:p>
-            <a:pPr algn="ctr"/>
-            <a:endParaRPr lang="en-US" sz="1200" dirty="0">
-              <a:solidFill>
-                <a:schemeClr val="tx1"/>
-              </a:solidFill>
-            </a:endParaRPr>
+              <a:t> with standard column names (ESS format)</a:t>
+            </a:r>
           </a:p>
         </p:txBody>
       </p:sp>
@@ -4184,7 +3980,24 @@
           <a:bodyPr rtlCol="0" anchor="ctr"/>
           <a:lstStyle/>
           <a:p>
-            <a:pPr algn="ctr"/>
+            <a:pPr marL="171450" indent="-171450">
+              <a:buFont typeface="Arial" panose="020B0604020202020204" pitchFamily="34" charset="0"/>
+              <a:buChar char="•"/>
+            </a:pPr>
+            <a:r>
+              <a:rPr lang="en-US" sz="1200" dirty="0">
+                <a:solidFill>
+                  <a:schemeClr val="tx1"/>
+                </a:solidFill>
+              </a:rPr>
+              <a:t>3_Combine_spectra_traits.R</a:t>
+            </a:r>
+          </a:p>
+          <a:p>
+            <a:pPr marL="171450" indent="-171450">
+              <a:buFont typeface="Arial" panose="020B0604020202020204" pitchFamily="34" charset="0"/>
+              <a:buChar char="•"/>
+            </a:pPr>
             <a:r>
               <a:rPr lang="en-US" sz="1200" dirty="0">
                 <a:solidFill>
@@ -4207,23 +4020,7 @@
                   <a:schemeClr val="tx1"/>
                 </a:solidFill>
               </a:rPr>
-              <a:t> with columns: </a:t>
-            </a:r>
-            <a:r>
-              <a:rPr lang="en-US" sz="1200" dirty="0" err="1">
-                <a:solidFill>
-                  <a:schemeClr val="tx1"/>
-                </a:solidFill>
-              </a:rPr>
-              <a:t>SampleID</a:t>
-            </a:r>
-            <a:r>
-              <a:rPr lang="en-US" sz="1200" dirty="0">
-                <a:solidFill>
-                  <a:schemeClr val="tx1"/>
-                </a:solidFill>
-              </a:rPr>
-              <a:t> and Spectra. Note that Spectra is a matrix with N columns, from 350 to 2500 nm or 500 to 2400 </a:t>
+              <a:t> with standard columns; the spectra should be from 500 to 2400 nm with a 1nm resolution</a:t>
             </a:r>
           </a:p>
         </p:txBody>
@@ -4239,115 +4036,14 @@
           </p:cNvPr>
           <p:cNvCxnSpPr>
             <a:cxnSpLocks/>
-          </p:cNvCxnSpPr>
-          <p:nvPr/>
-        </p:nvCxnSpPr>
-        <p:spPr>
-          <a:xfrm flipH="1">
-            <a:off x="7980218" y="1776614"/>
-            <a:ext cx="1" cy="470130"/>
-          </a:xfrm>
-          <a:prstGeom prst="straightConnector1">
-            <a:avLst/>
-          </a:prstGeom>
-          <a:ln>
-            <a:tailEnd type="triangle"/>
-          </a:ln>
-        </p:spPr>
-        <p:style>
-          <a:lnRef idx="1">
-            <a:schemeClr val="accent1"/>
-          </a:lnRef>
-          <a:fillRef idx="0">
-            <a:schemeClr val="accent1"/>
-          </a:fillRef>
-          <a:effectRef idx="0">
-            <a:schemeClr val="accent1"/>
-          </a:effectRef>
-          <a:fontRef idx="minor">
-            <a:schemeClr val="tx1"/>
-          </a:fontRef>
-        </p:style>
-      </p:cxnSp>
-      <p:sp>
-        <p:nvSpPr>
-          <p:cNvPr id="42" name="Rectangle 41">
-            <a:extLst>
-              <a:ext uri="{FF2B5EF4-FFF2-40B4-BE49-F238E27FC236}">
-                <a16:creationId xmlns:a16="http://schemas.microsoft.com/office/drawing/2014/main" id="{4AFC7C8E-868E-4DAA-9188-B5F3498784B5}"/>
-              </a:ext>
-            </a:extLst>
-          </p:cNvPr>
-          <p:cNvSpPr/>
-          <p:nvPr/>
-        </p:nvSpPr>
-        <p:spPr>
-          <a:xfrm>
-            <a:off x="6453448" y="2869738"/>
-            <a:ext cx="3053542" cy="518160"/>
-          </a:xfrm>
-          <a:prstGeom prst="rect">
-            <a:avLst/>
-          </a:prstGeom>
-          <a:solidFill>
-            <a:schemeClr val="accent1">
-              <a:lumMod val="20000"/>
-              <a:lumOff val="80000"/>
-            </a:schemeClr>
-          </a:solidFill>
-        </p:spPr>
-        <p:style>
-          <a:lnRef idx="2">
-            <a:schemeClr val="accent1">
-              <a:shade val="50000"/>
-            </a:schemeClr>
-          </a:lnRef>
-          <a:fillRef idx="1">
-            <a:schemeClr val="accent1"/>
-          </a:fillRef>
-          <a:effectRef idx="0">
-            <a:schemeClr val="accent1"/>
-          </a:effectRef>
-          <a:fontRef idx="minor">
-            <a:schemeClr val="lt1"/>
-          </a:fontRef>
-        </p:style>
-        <p:txBody>
-          <a:bodyPr rtlCol="0" anchor="ctr"/>
-          <a:lstStyle/>
-          <a:p>
-            <a:pPr algn="ctr"/>
-            <a:r>
-              <a:rPr lang="en-US" sz="1200" dirty="0">
-                <a:solidFill>
-                  <a:schemeClr val="tx1"/>
-                </a:solidFill>
-              </a:rPr>
-              <a:t>Display the spectra. Eventually calculate LMA with Shawn’s model to detect weirdness</a:t>
-            </a:r>
-          </a:p>
-        </p:txBody>
-      </p:sp>
-      <p:cxnSp>
-        <p:nvCxnSpPr>
-          <p:cNvPr id="44" name="Straight Arrow Connector 43">
-            <a:extLst>
-              <a:ext uri="{FF2B5EF4-FFF2-40B4-BE49-F238E27FC236}">
-                <a16:creationId xmlns:a16="http://schemas.microsoft.com/office/drawing/2014/main" id="{97D07B3E-0F7A-4CB0-8D8D-A3C2EE2FF86D}"/>
-              </a:ext>
-            </a:extLst>
-          </p:cNvPr>
-          <p:cNvCxnSpPr>
-            <a:cxnSpLocks/>
-            <a:stCxn id="42" idx="2"/>
             <a:endCxn id="16" idx="0"/>
           </p:cNvCxnSpPr>
           <p:nvPr/>
         </p:nvCxnSpPr>
         <p:spPr>
           <a:xfrm flipH="1">
-            <a:off x="6853150" y="3387898"/>
-            <a:ext cx="1127069" cy="1417320"/>
+            <a:off x="6853150" y="1776614"/>
+            <a:ext cx="1127069" cy="3028604"/>
           </a:xfrm>
           <a:prstGeom prst="straightConnector1">
             <a:avLst/>
@@ -4552,23 +4248,7 @@
                   <a:schemeClr val="tx1"/>
                 </a:solidFill>
               </a:rPr>
-              <a:t>, </a:t>
-            </a:r>
-            <a:r>
-              <a:rPr lang="en-US" sz="1200" dirty="0" err="1">
-                <a:solidFill>
-                  <a:schemeClr val="tx1"/>
-                </a:solidFill>
-              </a:rPr>
-              <a:t>Rday</a:t>
-            </a:r>
-            <a:r>
-              <a:rPr lang="en-US" sz="1200" dirty="0">
-                <a:solidFill>
-                  <a:schemeClr val="tx1"/>
-                </a:solidFill>
-              </a:rPr>
-              <a:t>, Vcmax25, Jmax25, Tp25,Rday25, </a:t>
+              <a:t>, Vcmax25, Jmax25, Tp25, </a:t>
             </a:r>
             <a:r>
               <a:rPr lang="en-US" sz="1200" dirty="0" err="1">

</xml_diff>

<commit_message>
Adding the Rdark process
</commit_message>
<xml_diff>
--- a/Overal_data_curation.pptx
+++ b/Overal_data_curation.pptx
@@ -259,7 +259,7 @@
           <a:p>
             <a:fld id="{F3787539-ED79-4958-8487-251D7A27B661}" type="datetimeFigureOut">
               <a:rPr lang="en-US" smtClean="0"/>
-              <a:t>2/9/2023</a:t>
+              <a:t>2/14/2023</a:t>
             </a:fld>
             <a:endParaRPr lang="en-US"/>
           </a:p>
@@ -457,7 +457,7 @@
           <a:p>
             <a:fld id="{F3787539-ED79-4958-8487-251D7A27B661}" type="datetimeFigureOut">
               <a:rPr lang="en-US" smtClean="0"/>
-              <a:t>2/9/2023</a:t>
+              <a:t>2/14/2023</a:t>
             </a:fld>
             <a:endParaRPr lang="en-US"/>
           </a:p>
@@ -665,7 +665,7 @@
           <a:p>
             <a:fld id="{F3787539-ED79-4958-8487-251D7A27B661}" type="datetimeFigureOut">
               <a:rPr lang="en-US" smtClean="0"/>
-              <a:t>2/9/2023</a:t>
+              <a:t>2/14/2023</a:t>
             </a:fld>
             <a:endParaRPr lang="en-US"/>
           </a:p>
@@ -863,7 +863,7 @@
           <a:p>
             <a:fld id="{F3787539-ED79-4958-8487-251D7A27B661}" type="datetimeFigureOut">
               <a:rPr lang="en-US" smtClean="0"/>
-              <a:t>2/9/2023</a:t>
+              <a:t>2/14/2023</a:t>
             </a:fld>
             <a:endParaRPr lang="en-US"/>
           </a:p>
@@ -1138,7 +1138,7 @@
           <a:p>
             <a:fld id="{F3787539-ED79-4958-8487-251D7A27B661}" type="datetimeFigureOut">
               <a:rPr lang="en-US" smtClean="0"/>
-              <a:t>2/9/2023</a:t>
+              <a:t>2/14/2023</a:t>
             </a:fld>
             <a:endParaRPr lang="en-US"/>
           </a:p>
@@ -1403,7 +1403,7 @@
           <a:p>
             <a:fld id="{F3787539-ED79-4958-8487-251D7A27B661}" type="datetimeFigureOut">
               <a:rPr lang="en-US" smtClean="0"/>
-              <a:t>2/9/2023</a:t>
+              <a:t>2/14/2023</a:t>
             </a:fld>
             <a:endParaRPr lang="en-US"/>
           </a:p>
@@ -1815,7 +1815,7 @@
           <a:p>
             <a:fld id="{F3787539-ED79-4958-8487-251D7A27B661}" type="datetimeFigureOut">
               <a:rPr lang="en-US" smtClean="0"/>
-              <a:t>2/9/2023</a:t>
+              <a:t>2/14/2023</a:t>
             </a:fld>
             <a:endParaRPr lang="en-US"/>
           </a:p>
@@ -1956,7 +1956,7 @@
           <a:p>
             <a:fld id="{F3787539-ED79-4958-8487-251D7A27B661}" type="datetimeFigureOut">
               <a:rPr lang="en-US" smtClean="0"/>
-              <a:t>2/9/2023</a:t>
+              <a:t>2/14/2023</a:t>
             </a:fld>
             <a:endParaRPr lang="en-US"/>
           </a:p>
@@ -2069,7 +2069,7 @@
           <a:p>
             <a:fld id="{F3787539-ED79-4958-8487-251D7A27B661}" type="datetimeFigureOut">
               <a:rPr lang="en-US" smtClean="0"/>
-              <a:t>2/9/2023</a:t>
+              <a:t>2/14/2023</a:t>
             </a:fld>
             <a:endParaRPr lang="en-US"/>
           </a:p>
@@ -2380,7 +2380,7 @@
           <a:p>
             <a:fld id="{F3787539-ED79-4958-8487-251D7A27B661}" type="datetimeFigureOut">
               <a:rPr lang="en-US" smtClean="0"/>
-              <a:t>2/9/2023</a:t>
+              <a:t>2/14/2023</a:t>
             </a:fld>
             <a:endParaRPr lang="en-US"/>
           </a:p>
@@ -2668,7 +2668,7 @@
           <a:p>
             <a:fld id="{F3787539-ED79-4958-8487-251D7A27B661}" type="datetimeFigureOut">
               <a:rPr lang="en-US" smtClean="0"/>
-              <a:t>2/9/2023</a:t>
+              <a:t>2/14/2023</a:t>
             </a:fld>
             <a:endParaRPr lang="en-US"/>
           </a:p>
@@ -2909,7 +2909,7 @@
           <a:p>
             <a:fld id="{F3787539-ED79-4958-8487-251D7A27B661}" type="datetimeFigureOut">
               <a:rPr lang="en-US" smtClean="0"/>
-              <a:t>2/9/2023</a:t>
+              <a:t>2/14/2023</a:t>
             </a:fld>
             <a:endParaRPr lang="en-US"/>
           </a:p>
@@ -3602,7 +3602,7 @@
         </p:nvSpPr>
         <p:spPr>
           <a:xfrm>
-            <a:off x="7451082" y="1154195"/>
+            <a:off x="7451082" y="945476"/>
             <a:ext cx="1100682" cy="635562"/>
           </a:xfrm>
           <a:prstGeom prst="rect">
@@ -3789,7 +3789,7 @@
         </p:nvSpPr>
         <p:spPr>
           <a:xfrm>
-            <a:off x="10681902" y="2881324"/>
+            <a:off x="10681902" y="2672605"/>
             <a:ext cx="1238772" cy="634377"/>
           </a:xfrm>
           <a:prstGeom prst="rect">
@@ -3910,7 +3910,7 @@
         </p:nvSpPr>
         <p:spPr>
           <a:xfrm>
-            <a:off x="8953737" y="2881324"/>
+            <a:off x="8953737" y="2672605"/>
             <a:ext cx="1569227" cy="635562"/>
           </a:xfrm>
           <a:prstGeom prst="rect">
@@ -4012,7 +4012,7 @@
         </p:nvSpPr>
         <p:spPr>
           <a:xfrm>
-            <a:off x="7225572" y="2881324"/>
+            <a:off x="7225572" y="2672605"/>
             <a:ext cx="1569227" cy="756398"/>
           </a:xfrm>
           <a:prstGeom prst="rect">
@@ -4249,7 +4249,7 @@
         </p:nvSpPr>
         <p:spPr>
           <a:xfrm>
-            <a:off x="10681901" y="3521415"/>
+            <a:off x="10681901" y="3312696"/>
             <a:ext cx="1238773" cy="1041725"/>
           </a:xfrm>
           <a:prstGeom prst="rect">
@@ -4557,7 +4557,7 @@
         </p:nvSpPr>
         <p:spPr>
           <a:xfrm>
-            <a:off x="8953736" y="3522544"/>
+            <a:off x="8953736" y="3313825"/>
             <a:ext cx="1569727" cy="1233541"/>
           </a:xfrm>
           <a:prstGeom prst="rect">
@@ -4997,7 +4997,7 @@
         </p:nvSpPr>
         <p:spPr>
           <a:xfrm>
-            <a:off x="7225571" y="3635058"/>
+            <a:off x="7225571" y="3426339"/>
             <a:ext cx="1569226" cy="2523152"/>
           </a:xfrm>
           <a:prstGeom prst="rect">
@@ -5817,7 +5817,7 @@
         </p:nvSpPr>
         <p:spPr>
           <a:xfrm>
-            <a:off x="9102105" y="1150238"/>
+            <a:off x="9102105" y="941519"/>
             <a:ext cx="1506206" cy="823771"/>
           </a:xfrm>
           <a:prstGeom prst="rect">
@@ -6078,7 +6078,7 @@
         </p:nvCxnSpPr>
         <p:spPr>
           <a:xfrm>
-            <a:off x="8001423" y="1789757"/>
+            <a:off x="8001423" y="1581038"/>
             <a:ext cx="8763" cy="1091567"/>
           </a:xfrm>
           <a:prstGeom prst="straightConnector1">
@@ -6110,7 +6110,7 @@
         </p:nvSpPr>
         <p:spPr>
           <a:xfrm>
-            <a:off x="6978536" y="2020581"/>
+            <a:off x="6978536" y="1811862"/>
             <a:ext cx="2000250" cy="629919"/>
           </a:xfrm>
           <a:prstGeom prst="ellipse">
@@ -6202,7 +6202,7 @@
         </p:nvSpPr>
         <p:spPr>
           <a:xfrm>
-            <a:off x="10255886" y="1045228"/>
+            <a:off x="10255886" y="836509"/>
             <a:ext cx="352425" cy="707886"/>
           </a:xfrm>
           <a:prstGeom prst="rect">
@@ -6238,7 +6238,7 @@
         </p:nvSpPr>
         <p:spPr>
           <a:xfrm>
-            <a:off x="11563802" y="2798590"/>
+            <a:off x="11563802" y="2589871"/>
             <a:ext cx="352425" cy="707886"/>
           </a:xfrm>
           <a:prstGeom prst="rect">
@@ -6274,7 +6274,7 @@
         </p:nvSpPr>
         <p:spPr>
           <a:xfrm>
-            <a:off x="10170788" y="2798590"/>
+            <a:off x="10170788" y="2589871"/>
             <a:ext cx="352425" cy="707886"/>
           </a:xfrm>
           <a:prstGeom prst="rect">
@@ -6310,7 +6310,7 @@
         </p:nvSpPr>
         <p:spPr>
           <a:xfrm>
-            <a:off x="8209735" y="1003039"/>
+            <a:off x="8209735" y="794320"/>
             <a:ext cx="352425" cy="707886"/>
           </a:xfrm>
           <a:prstGeom prst="rect">
@@ -6346,7 +6346,7 @@
         </p:nvSpPr>
         <p:spPr>
           <a:xfrm>
-            <a:off x="9501048" y="5403789"/>
+            <a:off x="9501048" y="5195070"/>
             <a:ext cx="352425" cy="707886"/>
           </a:xfrm>
           <a:prstGeom prst="rect">
@@ -6382,7 +6382,7 @@
         </p:nvSpPr>
         <p:spPr>
           <a:xfrm>
-            <a:off x="9853473" y="5234512"/>
+            <a:off x="9853473" y="5025793"/>
             <a:ext cx="2017822" cy="523220"/>
           </a:xfrm>
           <a:prstGeom prst="rect">
@@ -6438,7 +6438,7 @@
         </p:nvCxnSpPr>
         <p:spPr>
           <a:xfrm>
-            <a:off x="5717164" y="1810938"/>
+            <a:off x="5717164" y="1602219"/>
             <a:ext cx="1" cy="1060593"/>
           </a:xfrm>
           <a:prstGeom prst="straightConnector1">
@@ -6470,7 +6470,7 @@
         </p:nvSpPr>
         <p:spPr>
           <a:xfrm>
-            <a:off x="5097777" y="1181018"/>
+            <a:off x="5097777" y="972299"/>
             <a:ext cx="1238773" cy="629920"/>
           </a:xfrm>
           <a:prstGeom prst="rect">
@@ -6623,7 +6623,7 @@
         </p:nvSpPr>
         <p:spPr>
           <a:xfrm>
-            <a:off x="4837537" y="2871531"/>
+            <a:off x="4837537" y="2662812"/>
             <a:ext cx="1759255" cy="625153"/>
           </a:xfrm>
           <a:prstGeom prst="rect">
@@ -6795,7 +6795,7 @@
         </p:nvSpPr>
         <p:spPr>
           <a:xfrm>
-            <a:off x="4837537" y="3496684"/>
+            <a:off x="4837537" y="3287965"/>
             <a:ext cx="1759255" cy="877140"/>
           </a:xfrm>
           <a:prstGeom prst="rect">
@@ -7074,7 +7074,7 @@
         </p:nvSpPr>
         <p:spPr>
           <a:xfrm>
-            <a:off x="4711887" y="2020581"/>
+            <a:off x="4711887" y="1811862"/>
             <a:ext cx="2000250" cy="629919"/>
           </a:xfrm>
           <a:prstGeom prst="ellipse">
@@ -7166,7 +7166,7 @@
         </p:nvSpPr>
         <p:spPr>
           <a:xfrm>
-            <a:off x="5984125" y="1056017"/>
+            <a:off x="5984125" y="847298"/>
             <a:ext cx="352425" cy="707886"/>
           </a:xfrm>
           <a:prstGeom prst="rect">
@@ -7202,7 +7202,7 @@
         </p:nvSpPr>
         <p:spPr>
           <a:xfrm>
-            <a:off x="547420" y="1144050"/>
+            <a:off x="547420" y="935331"/>
             <a:ext cx="1369377" cy="532772"/>
           </a:xfrm>
           <a:prstGeom prst="rect">
@@ -7357,7 +7357,7 @@
         </p:nvSpPr>
         <p:spPr>
           <a:xfrm>
-            <a:off x="314065" y="3714402"/>
+            <a:off x="314065" y="3505683"/>
             <a:ext cx="1497180" cy="625153"/>
           </a:xfrm>
           <a:prstGeom prst="rect">
@@ -7529,7 +7529,7 @@
         </p:nvSpPr>
         <p:spPr>
           <a:xfrm>
-            <a:off x="2634143" y="2894167"/>
+            <a:off x="2634143" y="2685448"/>
             <a:ext cx="1497180" cy="625153"/>
           </a:xfrm>
           <a:prstGeom prst="rect">
@@ -7701,7 +7701,7 @@
         </p:nvSpPr>
         <p:spPr>
           <a:xfrm>
-            <a:off x="314556" y="4339555"/>
+            <a:off x="314556" y="4130836"/>
             <a:ext cx="1497178" cy="1509085"/>
           </a:xfrm>
           <a:prstGeom prst="rect">
@@ -8148,7 +8148,7 @@
         </p:nvSpPr>
         <p:spPr>
           <a:xfrm>
-            <a:off x="2634145" y="3522544"/>
+            <a:off x="2634145" y="3313825"/>
             <a:ext cx="1497178" cy="2912738"/>
           </a:xfrm>
           <a:prstGeom prst="rect">
@@ -8777,146 +8777,21 @@
               <a:defRPr/>
             </a:pPr>
             <a:r>
-              <a:rPr kumimoji="0" lang="fr-FR" sz="1200" b="0" i="0" u="none" strike="noStrike" kern="1200" cap="none" spc="0" normalizeH="0" baseline="0" noProof="0" dirty="0">
-                <a:ln>
-                  <a:noFill/>
-                </a:ln>
-                <a:solidFill>
-                  <a:srgbClr val="4472C4"/>
-                </a:solidFill>
-                <a:effectLst/>
-                <a:uLnTx/>
-                <a:uFillTx/>
-                <a:latin typeface="Calibri" panose="020F0502020204030204"/>
-                <a:ea typeface="+mn-ea"/>
-                <a:cs typeface="+mn-cs"/>
-              </a:rPr>
-              <a:t>- Sigma</a:t>
-            </a:r>
-          </a:p>
-          <a:p>
-            <a:pPr marL="0" marR="0" lvl="0" indent="0" defTabSz="914400" eaLnBrk="1" fontAlgn="auto" latinLnBrk="0" hangingPunct="1">
-              <a:lnSpc>
-                <a:spcPct val="100000"/>
-              </a:lnSpc>
-              <a:spcBef>
-                <a:spcPts val="0"/>
-              </a:spcBef>
-              <a:spcAft>
-                <a:spcPts val="0"/>
-              </a:spcAft>
-              <a:buClrTx/>
-              <a:buSzTx/>
-              <a:buFontTx/>
-              <a:buNone/>
-              <a:tabLst/>
-              <a:defRPr/>
-            </a:pPr>
-            <a:r>
-              <a:rPr kumimoji="0" lang="fr-FR" sz="1200" b="0" i="0" u="none" strike="noStrike" kern="1200" cap="none" spc="0" normalizeH="0" baseline="0" noProof="0" dirty="0">
-                <a:ln>
-                  <a:noFill/>
-                </a:ln>
-                <a:solidFill>
-                  <a:srgbClr val="4472C4"/>
-                </a:solidFill>
-                <a:effectLst/>
-                <a:uLnTx/>
-                <a:uFillTx/>
-                <a:latin typeface="Calibri" panose="020F0502020204030204"/>
-                <a:ea typeface="+mn-ea"/>
-                <a:cs typeface="+mn-cs"/>
-              </a:rPr>
-              <a:t>- AIC</a:t>
-            </a:r>
-          </a:p>
-          <a:p>
-            <a:pPr marL="0" marR="0" lvl="0" indent="0" defTabSz="914400" eaLnBrk="1" fontAlgn="auto" latinLnBrk="0" hangingPunct="1">
-              <a:lnSpc>
-                <a:spcPct val="100000"/>
-              </a:lnSpc>
-              <a:spcBef>
-                <a:spcPts val="0"/>
-              </a:spcBef>
-              <a:spcAft>
-                <a:spcPts val="0"/>
-              </a:spcAft>
-              <a:buClrTx/>
-              <a:buSzTx/>
-              <a:buFontTx/>
-              <a:buNone/>
-              <a:tabLst/>
-              <a:defRPr/>
-            </a:pPr>
-            <a:r>
-              <a:rPr kumimoji="0" lang="fr-FR" sz="1200" b="0" i="0" u="none" strike="noStrike" kern="1200" cap="none" spc="0" normalizeH="0" baseline="0" noProof="0" dirty="0">
-                <a:ln>
-                  <a:noFill/>
-                </a:ln>
-                <a:solidFill>
-                  <a:srgbClr val="4472C4"/>
-                </a:solidFill>
-                <a:effectLst/>
-                <a:uLnTx/>
-                <a:uFillTx/>
-                <a:latin typeface="Calibri" panose="020F0502020204030204"/>
-                <a:ea typeface="+mn-ea"/>
-                <a:cs typeface="+mn-cs"/>
-              </a:rPr>
-              <a:t>- Model</a:t>
-            </a:r>
-          </a:p>
-          <a:p>
-            <a:pPr marL="0" marR="0" lvl="0" indent="0" defTabSz="914400" eaLnBrk="1" fontAlgn="auto" latinLnBrk="0" hangingPunct="1">
-              <a:lnSpc>
-                <a:spcPct val="100000"/>
-              </a:lnSpc>
-              <a:spcBef>
-                <a:spcPts val="0"/>
-              </a:spcBef>
-              <a:spcAft>
-                <a:spcPts val="0"/>
-              </a:spcAft>
-              <a:buClrTx/>
-              <a:buSzTx/>
-              <a:buFontTx/>
-              <a:buNone/>
-              <a:tabLst/>
-              <a:defRPr/>
-            </a:pPr>
-            <a:r>
-              <a:rPr kumimoji="0" lang="fr-FR" sz="1200" b="0" i="0" u="none" strike="noStrike" kern="1200" cap="none" spc="0" normalizeH="0" baseline="0" noProof="0" dirty="0">
-                <a:ln>
-                  <a:noFill/>
-                </a:ln>
-                <a:solidFill>
-                  <a:srgbClr val="4472C4"/>
-                </a:solidFill>
-                <a:effectLst/>
-                <a:uLnTx/>
-                <a:uFillTx/>
-                <a:latin typeface="Calibri" panose="020F0502020204030204"/>
-                <a:ea typeface="+mn-ea"/>
-                <a:cs typeface="+mn-cs"/>
-              </a:rPr>
-              <a:t>- </a:t>
-            </a:r>
-            <a:r>
-              <a:rPr kumimoji="0" lang="fr-FR" sz="1200" b="0" i="0" u="none" strike="noStrike" kern="1200" cap="none" spc="0" normalizeH="0" baseline="0" noProof="0" dirty="0" err="1">
-                <a:ln>
-                  <a:noFill/>
-                </a:ln>
-                <a:solidFill>
-                  <a:srgbClr val="4472C4"/>
-                </a:solidFill>
-                <a:effectLst/>
-                <a:uLnTx/>
-                <a:uFillTx/>
-                <a:latin typeface="Calibri" panose="020F0502020204030204"/>
-                <a:ea typeface="+mn-ea"/>
-                <a:cs typeface="+mn-cs"/>
-              </a:rPr>
-              <a:t>Fitting_method</a:t>
+              <a:rPr kumimoji="0" lang="fr-FR" sz="1200" b="0" i="0" u="none" strike="noStrike" kern="1200" cap="none" spc="0" normalizeH="0" baseline="0" noProof="0">
+                <a:ln>
+                  <a:noFill/>
+                </a:ln>
+                <a:solidFill>
+                  <a:srgbClr val="4472C4"/>
+                </a:solidFill>
+                <a:effectLst/>
+                <a:uLnTx/>
+                <a:uFillTx/>
+                <a:latin typeface="Calibri" panose="020F0502020204030204"/>
+                <a:ea typeface="+mn-ea"/>
+                <a:cs typeface="+mn-cs"/>
+              </a:rPr>
+              <a:t>- sigma</a:t>
             </a:r>
             <a:endParaRPr kumimoji="0" lang="fr-FR" sz="1200" b="0" i="0" u="none" strike="noStrike" kern="1200" cap="none" spc="0" normalizeH="0" baseline="0" noProof="0" dirty="0">
               <a:ln>
@@ -8933,6 +8808,145 @@
               <a:cs typeface="+mn-cs"/>
             </a:endParaRPr>
           </a:p>
+          <a:p>
+            <a:pPr marL="0" marR="0" lvl="0" indent="0" defTabSz="914400" eaLnBrk="1" fontAlgn="auto" latinLnBrk="0" hangingPunct="1">
+              <a:lnSpc>
+                <a:spcPct val="100000"/>
+              </a:lnSpc>
+              <a:spcBef>
+                <a:spcPts val="0"/>
+              </a:spcBef>
+              <a:spcAft>
+                <a:spcPts val="0"/>
+              </a:spcAft>
+              <a:buClrTx/>
+              <a:buSzTx/>
+              <a:buFontTx/>
+              <a:buNone/>
+              <a:tabLst/>
+              <a:defRPr/>
+            </a:pPr>
+            <a:r>
+              <a:rPr kumimoji="0" lang="fr-FR" sz="1200" b="0" i="0" u="none" strike="noStrike" kern="1200" cap="none" spc="0" normalizeH="0" baseline="0" noProof="0" dirty="0">
+                <a:ln>
+                  <a:noFill/>
+                </a:ln>
+                <a:solidFill>
+                  <a:srgbClr val="4472C4"/>
+                </a:solidFill>
+                <a:effectLst/>
+                <a:uLnTx/>
+                <a:uFillTx/>
+                <a:latin typeface="Calibri" panose="020F0502020204030204"/>
+                <a:ea typeface="+mn-ea"/>
+                <a:cs typeface="+mn-cs"/>
+              </a:rPr>
+              <a:t>- AIC</a:t>
+            </a:r>
+          </a:p>
+          <a:p>
+            <a:pPr marL="0" marR="0" lvl="0" indent="0" defTabSz="914400" eaLnBrk="1" fontAlgn="auto" latinLnBrk="0" hangingPunct="1">
+              <a:lnSpc>
+                <a:spcPct val="100000"/>
+              </a:lnSpc>
+              <a:spcBef>
+                <a:spcPts val="0"/>
+              </a:spcBef>
+              <a:spcAft>
+                <a:spcPts val="0"/>
+              </a:spcAft>
+              <a:buClrTx/>
+              <a:buSzTx/>
+              <a:buFontTx/>
+              <a:buNone/>
+              <a:tabLst/>
+              <a:defRPr/>
+            </a:pPr>
+            <a:r>
+              <a:rPr kumimoji="0" lang="fr-FR" sz="1200" b="0" i="0" u="none" strike="noStrike" kern="1200" cap="none" spc="0" normalizeH="0" baseline="0" noProof="0" dirty="0">
+                <a:ln>
+                  <a:noFill/>
+                </a:ln>
+                <a:solidFill>
+                  <a:srgbClr val="4472C4"/>
+                </a:solidFill>
+                <a:effectLst/>
+                <a:uLnTx/>
+                <a:uFillTx/>
+                <a:latin typeface="Calibri" panose="020F0502020204030204"/>
+                <a:ea typeface="+mn-ea"/>
+                <a:cs typeface="+mn-cs"/>
+              </a:rPr>
+              <a:t>- Model</a:t>
+            </a:r>
+          </a:p>
+          <a:p>
+            <a:pPr marL="0" marR="0" lvl="0" indent="0" defTabSz="914400" eaLnBrk="1" fontAlgn="auto" latinLnBrk="0" hangingPunct="1">
+              <a:lnSpc>
+                <a:spcPct val="100000"/>
+              </a:lnSpc>
+              <a:spcBef>
+                <a:spcPts val="0"/>
+              </a:spcBef>
+              <a:spcAft>
+                <a:spcPts val="0"/>
+              </a:spcAft>
+              <a:buClrTx/>
+              <a:buSzTx/>
+              <a:buFontTx/>
+              <a:buNone/>
+              <a:tabLst/>
+              <a:defRPr/>
+            </a:pPr>
+            <a:r>
+              <a:rPr kumimoji="0" lang="fr-FR" sz="1200" b="0" i="0" u="none" strike="noStrike" kern="1200" cap="none" spc="0" normalizeH="0" baseline="0" noProof="0" dirty="0">
+                <a:ln>
+                  <a:noFill/>
+                </a:ln>
+                <a:solidFill>
+                  <a:srgbClr val="4472C4"/>
+                </a:solidFill>
+                <a:effectLst/>
+                <a:uLnTx/>
+                <a:uFillTx/>
+                <a:latin typeface="Calibri" panose="020F0502020204030204"/>
+                <a:ea typeface="+mn-ea"/>
+                <a:cs typeface="+mn-cs"/>
+              </a:rPr>
+              <a:t>- </a:t>
+            </a:r>
+            <a:r>
+              <a:rPr kumimoji="0" lang="fr-FR" sz="1200" b="0" i="0" u="none" strike="noStrike" kern="1200" cap="none" spc="0" normalizeH="0" baseline="0" noProof="0" dirty="0" err="1">
+                <a:ln>
+                  <a:noFill/>
+                </a:ln>
+                <a:solidFill>
+                  <a:srgbClr val="4472C4"/>
+                </a:solidFill>
+                <a:effectLst/>
+                <a:uLnTx/>
+                <a:uFillTx/>
+                <a:latin typeface="Calibri" panose="020F0502020204030204"/>
+                <a:ea typeface="+mn-ea"/>
+                <a:cs typeface="+mn-cs"/>
+              </a:rPr>
+              <a:t>Fitting_method</a:t>
+            </a:r>
+            <a:endParaRPr kumimoji="0" lang="fr-FR" sz="1200" b="0" i="0" u="none" strike="noStrike" kern="1200" cap="none" spc="0" normalizeH="0" baseline="0" noProof="0" dirty="0">
+              <a:ln>
+                <a:noFill/>
+              </a:ln>
+              <a:solidFill>
+                <a:srgbClr val="4472C4"/>
+              </a:solidFill>
+              <a:effectLst/>
+              <a:uLnTx/>
+              <a:uFillTx/>
+              <a:latin typeface="Calibri" panose="020F0502020204030204"/>
+              <a:ea typeface="+mn-ea"/>
+              <a:cs typeface="+mn-cs"/>
+            </a:endParaRPr>
+          </a:p>
         </p:txBody>
       </p:sp>
       <p:sp>
@@ -8949,7 +8963,7 @@
         </p:nvSpPr>
         <p:spPr>
           <a:xfrm>
-            <a:off x="231983" y="1972345"/>
+            <a:off x="231983" y="1763626"/>
             <a:ext cx="2000250" cy="629919"/>
           </a:xfrm>
           <a:prstGeom prst="ellipse">
@@ -9041,7 +9055,7 @@
         </p:nvSpPr>
         <p:spPr>
           <a:xfrm>
-            <a:off x="997515" y="6029628"/>
+            <a:off x="997515" y="5820909"/>
             <a:ext cx="1133713" cy="629919"/>
           </a:xfrm>
           <a:prstGeom prst="ellipse">
@@ -9137,7 +9151,7 @@
         </p:nvCxnSpPr>
         <p:spPr>
           <a:xfrm flipH="1">
-            <a:off x="1232108" y="1676822"/>
+            <a:off x="1232108" y="1468103"/>
             <a:ext cx="1" cy="295523"/>
           </a:xfrm>
           <a:prstGeom prst="straightConnector1">
@@ -9180,7 +9194,7 @@
         </p:nvCxnSpPr>
         <p:spPr>
           <a:xfrm flipH="1">
-            <a:off x="1062655" y="3415896"/>
+            <a:off x="1062655" y="3207177"/>
             <a:ext cx="169453" cy="298506"/>
           </a:xfrm>
           <a:prstGeom prst="straightConnector1">
@@ -9223,7 +9237,7 @@
         </p:nvCxnSpPr>
         <p:spPr>
           <a:xfrm>
-            <a:off x="1063145" y="5848640"/>
+            <a:off x="1063145" y="5639921"/>
             <a:ext cx="100398" cy="273238"/>
           </a:xfrm>
           <a:prstGeom prst="straightConnector1">
@@ -9262,7 +9276,7 @@
         </p:nvSpPr>
         <p:spPr>
           <a:xfrm>
-            <a:off x="157026" y="2785977"/>
+            <a:off x="157026" y="2577258"/>
             <a:ext cx="2150164" cy="629919"/>
           </a:xfrm>
           <a:prstGeom prst="ellipse">
@@ -9338,7 +9352,7 @@
         </p:nvCxnSpPr>
         <p:spPr>
           <a:xfrm>
-            <a:off x="1232108" y="2602264"/>
+            <a:off x="1232108" y="2393545"/>
             <a:ext cx="0" cy="183713"/>
           </a:xfrm>
           <a:prstGeom prst="straightConnector1">
@@ -9377,7 +9391,7 @@
         </p:nvSpPr>
         <p:spPr>
           <a:xfrm>
-            <a:off x="1564372" y="1246945"/>
+            <a:off x="1564372" y="1038226"/>
             <a:ext cx="352425" cy="707886"/>
           </a:xfrm>
           <a:prstGeom prst="rect">
@@ -9417,7 +9431,7 @@
         </p:nvCxnSpPr>
         <p:spPr>
           <a:xfrm flipV="1">
-            <a:off x="1965200" y="4978913"/>
+            <a:off x="1965200" y="4770194"/>
             <a:ext cx="668945" cy="1142965"/>
           </a:xfrm>
           <a:prstGeom prst="straightConnector1">
@@ -9456,8 +9470,8 @@
         </p:nvSpPr>
         <p:spPr>
           <a:xfrm>
-            <a:off x="4918680" y="4775412"/>
-            <a:ext cx="1497180" cy="625153"/>
+            <a:off x="4918680" y="5503894"/>
+            <a:ext cx="1497180" cy="532772"/>
           </a:xfrm>
           <a:prstGeom prst="rect">
             <a:avLst/>
@@ -9578,7 +9592,7 @@
                 <a:ea typeface="+mn-ea"/>
                 <a:cs typeface="+mn-cs"/>
               </a:rPr>
-              <a:t>Rdark.Rdata</a:t>
+              <a:t>Rdark_data.Rdata</a:t>
             </a:r>
             <a:r>
               <a:rPr kumimoji="0" lang="fr-FR" sz="1200" b="0" i="0" u="none" strike="noStrike" kern="1200" cap="none" spc="0" normalizeH="0" baseline="0" noProof="0" dirty="0">
@@ -9628,7 +9642,7 @@
         </p:nvSpPr>
         <p:spPr>
           <a:xfrm>
-            <a:off x="4918682" y="5403789"/>
+            <a:off x="4918682" y="6039890"/>
             <a:ext cx="1497178" cy="707886"/>
           </a:xfrm>
           <a:prstGeom prst="rect">
@@ -9850,6 +9864,325 @@
           </a:p>
         </p:txBody>
       </p:sp>
+      <p:sp>
+        <p:nvSpPr>
+          <p:cNvPr id="42" name="Rectangle 41">
+            <a:extLst>
+              <a:ext uri="{FF2B5EF4-FFF2-40B4-BE49-F238E27FC236}">
+                <a16:creationId xmlns:a16="http://schemas.microsoft.com/office/drawing/2014/main" id="{D156BEA3-237A-4E5B-8DC3-CA52D0634CC2}"/>
+              </a:ext>
+            </a:extLst>
+          </p:cNvPr>
+          <p:cNvSpPr/>
+          <p:nvPr/>
+        </p:nvSpPr>
+        <p:spPr>
+          <a:xfrm>
+            <a:off x="4905982" y="4305233"/>
+            <a:ext cx="1497178" cy="532772"/>
+          </a:xfrm>
+          <a:prstGeom prst="rect">
+            <a:avLst/>
+          </a:prstGeom>
+          <a:noFill/>
+          <a:ln w="12700" cap="flat" cmpd="sng" algn="ctr">
+            <a:solidFill>
+              <a:sysClr val="windowText" lastClr="000000"/>
+            </a:solidFill>
+            <a:prstDash val="solid"/>
+            <a:miter lim="800000"/>
+          </a:ln>
+          <a:effectLst/>
+        </p:spPr>
+        <p:txBody>
+          <a:bodyPr rtlCol="0" anchor="ctr"/>
+          <a:lstStyle/>
+          <a:p>
+            <a:pPr marL="0" marR="0" lvl="0" indent="0" defTabSz="914400" eaLnBrk="1" fontAlgn="auto" latinLnBrk="0" hangingPunct="1">
+              <a:lnSpc>
+                <a:spcPct val="100000"/>
+              </a:lnSpc>
+              <a:spcBef>
+                <a:spcPts val="0"/>
+              </a:spcBef>
+              <a:spcAft>
+                <a:spcPts val="0"/>
+              </a:spcAft>
+              <a:buClrTx/>
+              <a:buSzTx/>
+              <a:buFontTx/>
+              <a:buNone/>
+              <a:tabLst/>
+              <a:defRPr/>
+            </a:pPr>
+            <a:r>
+              <a:rPr kumimoji="0" lang="fr-FR" sz="1200" b="0" i="0" u="none" strike="noStrike" kern="1200" cap="none" spc="0" normalizeH="0" baseline="0" noProof="0" dirty="0">
+                <a:ln>
+                  <a:noFill/>
+                </a:ln>
+                <a:solidFill>
+                  <a:prstClr val="black"/>
+                </a:solidFill>
+                <a:effectLst/>
+                <a:uLnTx/>
+                <a:uFillTx/>
+                <a:latin typeface="Calibri" panose="020F0502020204030204"/>
+                <a:ea typeface="+mn-ea"/>
+                <a:cs typeface="+mn-cs"/>
+              </a:rPr>
+              <a:t>Original </a:t>
+            </a:r>
+            <a:r>
+              <a:rPr kumimoji="0" lang="fr-FR" sz="1200" b="0" i="0" u="none" strike="noStrike" kern="1200" cap="none" spc="0" normalizeH="0" baseline="0" noProof="0" dirty="0" err="1">
+                <a:ln>
+                  <a:noFill/>
+                </a:ln>
+                <a:solidFill>
+                  <a:prstClr val="black"/>
+                </a:solidFill>
+                <a:effectLst/>
+                <a:uLnTx/>
+                <a:uFillTx/>
+                <a:latin typeface="Calibri" panose="020F0502020204030204"/>
+                <a:ea typeface="+mn-ea"/>
+                <a:cs typeface="+mn-cs"/>
+              </a:rPr>
+              <a:t>Rdark</a:t>
+            </a:r>
+            <a:r>
+              <a:rPr kumimoji="0" lang="fr-FR" sz="1200" b="0" i="0" u="none" strike="noStrike" kern="1200" cap="none" spc="0" normalizeH="0" baseline="0" noProof="0" dirty="0">
+                <a:ln>
+                  <a:noFill/>
+                </a:ln>
+                <a:solidFill>
+                  <a:prstClr val="black"/>
+                </a:solidFill>
+                <a:effectLst/>
+                <a:uLnTx/>
+                <a:uFillTx/>
+                <a:latin typeface="Calibri" panose="020F0502020204030204"/>
+                <a:ea typeface="+mn-ea"/>
+                <a:cs typeface="+mn-cs"/>
+              </a:rPr>
+              <a:t> data </a:t>
+            </a:r>
+          </a:p>
+          <a:p>
+            <a:pPr marL="0" marR="0" lvl="0" indent="0" defTabSz="914400" eaLnBrk="1" fontAlgn="auto" latinLnBrk="0" hangingPunct="1">
+              <a:lnSpc>
+                <a:spcPct val="100000"/>
+              </a:lnSpc>
+              <a:spcBef>
+                <a:spcPts val="0"/>
+              </a:spcBef>
+              <a:spcAft>
+                <a:spcPts val="0"/>
+              </a:spcAft>
+              <a:buClrTx/>
+              <a:buSzTx/>
+              <a:buFontTx/>
+              <a:buNone/>
+              <a:tabLst/>
+              <a:defRPr/>
+            </a:pPr>
+            <a:r>
+              <a:rPr kumimoji="0" lang="fr-FR" sz="1200" b="0" i="0" u="none" strike="noStrike" kern="1200" cap="none" spc="0" normalizeH="0" baseline="0" noProof="0" dirty="0">
+                <a:ln>
+                  <a:noFill/>
+                </a:ln>
+                <a:solidFill>
+                  <a:prstClr val="black"/>
+                </a:solidFill>
+                <a:effectLst/>
+                <a:uLnTx/>
+                <a:uFillTx/>
+                <a:latin typeface="Calibri" panose="020F0502020204030204"/>
+                <a:ea typeface="+mn-ea"/>
+                <a:cs typeface="+mn-cs"/>
+              </a:rPr>
+              <a:t>(free format)</a:t>
+            </a:r>
+            <a:endParaRPr kumimoji="0" lang="en-US" sz="1200" b="0" i="0" u="none" strike="noStrike" kern="1200" cap="none" spc="0" normalizeH="0" baseline="0" noProof="0" dirty="0">
+              <a:ln>
+                <a:noFill/>
+              </a:ln>
+              <a:solidFill>
+                <a:prstClr val="black"/>
+              </a:solidFill>
+              <a:effectLst/>
+              <a:uLnTx/>
+              <a:uFillTx/>
+              <a:latin typeface="Calibri" panose="020F0502020204030204"/>
+              <a:ea typeface="+mn-ea"/>
+              <a:cs typeface="+mn-cs"/>
+            </a:endParaRPr>
+          </a:p>
+        </p:txBody>
+      </p:sp>
+      <p:sp>
+        <p:nvSpPr>
+          <p:cNvPr id="47" name="Ellipse 46">
+            <a:extLst>
+              <a:ext uri="{FF2B5EF4-FFF2-40B4-BE49-F238E27FC236}">
+                <a16:creationId xmlns:a16="http://schemas.microsoft.com/office/drawing/2014/main" id="{0FAC0E98-88CE-4FFB-9C94-7E171396AD15}"/>
+              </a:ext>
+            </a:extLst>
+          </p:cNvPr>
+          <p:cNvSpPr/>
+          <p:nvPr/>
+        </p:nvSpPr>
+        <p:spPr>
+          <a:xfrm>
+            <a:off x="4654446" y="4904563"/>
+            <a:ext cx="2000250" cy="532772"/>
+          </a:xfrm>
+          <a:prstGeom prst="ellipse">
+            <a:avLst/>
+          </a:prstGeom>
+          <a:solidFill>
+            <a:srgbClr val="4472C4">
+              <a:lumMod val="40000"/>
+              <a:lumOff val="60000"/>
+            </a:srgbClr>
+          </a:solidFill>
+          <a:ln w="12700" cap="flat" cmpd="sng" algn="ctr">
+            <a:solidFill>
+              <a:srgbClr val="4472C4">
+                <a:shade val="50000"/>
+              </a:srgbClr>
+            </a:solidFill>
+            <a:prstDash val="solid"/>
+            <a:miter lim="800000"/>
+          </a:ln>
+          <a:effectLst/>
+        </p:spPr>
+        <p:txBody>
+          <a:bodyPr rtlCol="0" anchor="ctr"/>
+          <a:lstStyle/>
+          <a:p>
+            <a:pPr marL="0" marR="0" lvl="0" indent="0" algn="ctr" defTabSz="914400" eaLnBrk="1" fontAlgn="auto" latinLnBrk="0" hangingPunct="1">
+              <a:lnSpc>
+                <a:spcPct val="100000"/>
+              </a:lnSpc>
+              <a:spcBef>
+                <a:spcPts val="0"/>
+              </a:spcBef>
+              <a:spcAft>
+                <a:spcPts val="0"/>
+              </a:spcAft>
+              <a:buClrTx/>
+              <a:buSzTx/>
+              <a:buFontTx/>
+              <a:buNone/>
+              <a:tabLst/>
+              <a:defRPr/>
+            </a:pPr>
+            <a:r>
+              <a:rPr kumimoji="0" lang="fr-FR" sz="1200" b="0" i="0" u="none" strike="noStrike" kern="1200" cap="none" spc="0" normalizeH="0" baseline="0" noProof="0" dirty="0" err="1">
+                <a:ln>
+                  <a:noFill/>
+                </a:ln>
+                <a:solidFill>
+                  <a:prstClr val="black"/>
+                </a:solidFill>
+                <a:effectLst/>
+                <a:uLnTx/>
+                <a:uFillTx/>
+                <a:latin typeface="Calibri" panose="020F0502020204030204"/>
+                <a:ea typeface="+mn-ea"/>
+                <a:cs typeface="+mn-cs"/>
+              </a:rPr>
+              <a:t>Import_transform_Rdark.R</a:t>
+            </a:r>
+            <a:endParaRPr kumimoji="0" lang="en-US" sz="1200" b="0" i="0" u="none" strike="noStrike" kern="1200" cap="none" spc="0" normalizeH="0" baseline="0" noProof="0" dirty="0">
+              <a:ln>
+                <a:noFill/>
+              </a:ln>
+              <a:solidFill>
+                <a:prstClr val="black"/>
+              </a:solidFill>
+              <a:effectLst/>
+              <a:uLnTx/>
+              <a:uFillTx/>
+              <a:latin typeface="Calibri" panose="020F0502020204030204"/>
+              <a:ea typeface="+mn-ea"/>
+              <a:cs typeface="+mn-cs"/>
+            </a:endParaRPr>
+          </a:p>
+        </p:txBody>
+      </p:sp>
+      <p:cxnSp>
+        <p:nvCxnSpPr>
+          <p:cNvPr id="48" name="Connecteur droit avec flèche 47">
+            <a:extLst>
+              <a:ext uri="{FF2B5EF4-FFF2-40B4-BE49-F238E27FC236}">
+                <a16:creationId xmlns:a16="http://schemas.microsoft.com/office/drawing/2014/main" id="{0709539E-7DE0-4DE2-A054-7517AAF2905B}"/>
+              </a:ext>
+            </a:extLst>
+          </p:cNvPr>
+          <p:cNvCxnSpPr>
+            <a:cxnSpLocks/>
+            <a:stCxn id="42" idx="2"/>
+            <a:endCxn id="47" idx="0"/>
+          </p:cNvCxnSpPr>
+          <p:nvPr/>
+        </p:nvCxnSpPr>
+        <p:spPr>
+          <a:xfrm>
+            <a:off x="5654571" y="4838005"/>
+            <a:ext cx="0" cy="66558"/>
+          </a:xfrm>
+          <a:prstGeom prst="straightConnector1">
+            <a:avLst/>
+          </a:prstGeom>
+          <a:noFill/>
+          <a:ln w="6350" cap="flat" cmpd="sng" algn="ctr">
+            <a:solidFill>
+              <a:srgbClr val="4472C4"/>
+            </a:solidFill>
+            <a:prstDash val="solid"/>
+            <a:miter lim="800000"/>
+            <a:tailEnd type="triangle"/>
+          </a:ln>
+          <a:effectLst/>
+        </p:spPr>
+      </p:cxnSp>
+      <p:cxnSp>
+        <p:nvCxnSpPr>
+          <p:cNvPr id="54" name="Connecteur droit avec flèche 53">
+            <a:extLst>
+              <a:ext uri="{FF2B5EF4-FFF2-40B4-BE49-F238E27FC236}">
+                <a16:creationId xmlns:a16="http://schemas.microsoft.com/office/drawing/2014/main" id="{0457A17C-EFDE-4EF0-9548-8331C787E556}"/>
+              </a:ext>
+            </a:extLst>
+          </p:cNvPr>
+          <p:cNvCxnSpPr>
+            <a:cxnSpLocks/>
+            <a:stCxn id="47" idx="4"/>
+            <a:endCxn id="107" idx="0"/>
+          </p:cNvCxnSpPr>
+          <p:nvPr/>
+        </p:nvCxnSpPr>
+        <p:spPr>
+          <a:xfrm>
+            <a:off x="5654571" y="5437335"/>
+            <a:ext cx="12699" cy="66559"/>
+          </a:xfrm>
+          <a:prstGeom prst="straightConnector1">
+            <a:avLst/>
+          </a:prstGeom>
+          <a:noFill/>
+          <a:ln w="6350" cap="flat" cmpd="sng" algn="ctr">
+            <a:solidFill>
+              <a:srgbClr val="4472C4"/>
+            </a:solidFill>
+            <a:prstDash val="solid"/>
+            <a:miter lim="800000"/>
+            <a:tailEnd type="triangle"/>
+          </a:ln>
+          <a:effectLst/>
+        </p:spPr>
+      </p:cxnSp>
     </p:spTree>
     <p:extLst>
       <p:ext uri="{BB962C8B-B14F-4D97-AF65-F5344CB8AC3E}">

</xml_diff>

<commit_message>
Including the leaf Phenological stage
</commit_message>
<xml_diff>
--- a/Overal_data_curation.pptx
+++ b/Overal_data_curation.pptx
@@ -259,7 +259,7 @@
           <a:p>
             <a:fld id="{F3787539-ED79-4958-8487-251D7A27B661}" type="datetimeFigureOut">
               <a:rPr lang="en-US" smtClean="0"/>
-              <a:t>2/14/2023</a:t>
+              <a:t>2/16/2023</a:t>
             </a:fld>
             <a:endParaRPr lang="en-US"/>
           </a:p>
@@ -457,7 +457,7 @@
           <a:p>
             <a:fld id="{F3787539-ED79-4958-8487-251D7A27B661}" type="datetimeFigureOut">
               <a:rPr lang="en-US" smtClean="0"/>
-              <a:t>2/14/2023</a:t>
+              <a:t>2/16/2023</a:t>
             </a:fld>
             <a:endParaRPr lang="en-US"/>
           </a:p>
@@ -665,7 +665,7 @@
           <a:p>
             <a:fld id="{F3787539-ED79-4958-8487-251D7A27B661}" type="datetimeFigureOut">
               <a:rPr lang="en-US" smtClean="0"/>
-              <a:t>2/14/2023</a:t>
+              <a:t>2/16/2023</a:t>
             </a:fld>
             <a:endParaRPr lang="en-US"/>
           </a:p>
@@ -863,7 +863,7 @@
           <a:p>
             <a:fld id="{F3787539-ED79-4958-8487-251D7A27B661}" type="datetimeFigureOut">
               <a:rPr lang="en-US" smtClean="0"/>
-              <a:t>2/14/2023</a:t>
+              <a:t>2/16/2023</a:t>
             </a:fld>
             <a:endParaRPr lang="en-US"/>
           </a:p>
@@ -1138,7 +1138,7 @@
           <a:p>
             <a:fld id="{F3787539-ED79-4958-8487-251D7A27B661}" type="datetimeFigureOut">
               <a:rPr lang="en-US" smtClean="0"/>
-              <a:t>2/14/2023</a:t>
+              <a:t>2/16/2023</a:t>
             </a:fld>
             <a:endParaRPr lang="en-US"/>
           </a:p>
@@ -1403,7 +1403,7 @@
           <a:p>
             <a:fld id="{F3787539-ED79-4958-8487-251D7A27B661}" type="datetimeFigureOut">
               <a:rPr lang="en-US" smtClean="0"/>
-              <a:t>2/14/2023</a:t>
+              <a:t>2/16/2023</a:t>
             </a:fld>
             <a:endParaRPr lang="en-US"/>
           </a:p>
@@ -1815,7 +1815,7 @@
           <a:p>
             <a:fld id="{F3787539-ED79-4958-8487-251D7A27B661}" type="datetimeFigureOut">
               <a:rPr lang="en-US" smtClean="0"/>
-              <a:t>2/14/2023</a:t>
+              <a:t>2/16/2023</a:t>
             </a:fld>
             <a:endParaRPr lang="en-US"/>
           </a:p>
@@ -1956,7 +1956,7 @@
           <a:p>
             <a:fld id="{F3787539-ED79-4958-8487-251D7A27B661}" type="datetimeFigureOut">
               <a:rPr lang="en-US" smtClean="0"/>
-              <a:t>2/14/2023</a:t>
+              <a:t>2/16/2023</a:t>
             </a:fld>
             <a:endParaRPr lang="en-US"/>
           </a:p>
@@ -2069,7 +2069,7 @@
           <a:p>
             <a:fld id="{F3787539-ED79-4958-8487-251D7A27B661}" type="datetimeFigureOut">
               <a:rPr lang="en-US" smtClean="0"/>
-              <a:t>2/14/2023</a:t>
+              <a:t>2/16/2023</a:t>
             </a:fld>
             <a:endParaRPr lang="en-US"/>
           </a:p>
@@ -2380,7 +2380,7 @@
           <a:p>
             <a:fld id="{F3787539-ED79-4958-8487-251D7A27B661}" type="datetimeFigureOut">
               <a:rPr lang="en-US" smtClean="0"/>
-              <a:t>2/14/2023</a:t>
+              <a:t>2/16/2023</a:t>
             </a:fld>
             <a:endParaRPr lang="en-US"/>
           </a:p>
@@ -2668,7 +2668,7 @@
           <a:p>
             <a:fld id="{F3787539-ED79-4958-8487-251D7A27B661}" type="datetimeFigureOut">
               <a:rPr lang="en-US" smtClean="0"/>
-              <a:t>2/14/2023</a:t>
+              <a:t>2/16/2023</a:t>
             </a:fld>
             <a:endParaRPr lang="en-US"/>
           </a:p>
@@ -2909,7 +2909,7 @@
           <a:p>
             <a:fld id="{F3787539-ED79-4958-8487-251D7A27B661}" type="datetimeFigureOut">
               <a:rPr lang="en-US" smtClean="0"/>
-              <a:t>2/14/2023</a:t>
+              <a:t>2/16/2023</a:t>
             </a:fld>
             <a:endParaRPr lang="en-US"/>
           </a:p>
@@ -5285,7 +5285,7 @@
             </a:endParaRPr>
           </a:p>
           <a:p>
-            <a:pPr marL="0" marR="0" lvl="0" indent="0" defTabSz="914400" eaLnBrk="1" fontAlgn="auto" latinLnBrk="0" hangingPunct="1">
+            <a:pPr marR="0" lvl="0" defTabSz="914400" eaLnBrk="1" fontAlgn="auto" latinLnBrk="0" hangingPunct="1">
               <a:lnSpc>
                 <a:spcPct val="100000"/>
               </a:lnSpc>
@@ -5297,25 +5297,15 @@
               </a:spcAft>
               <a:buClrTx/>
               <a:buSzTx/>
-              <a:buFontTx/>
-              <a:buNone/>
               <a:tabLst/>
               <a:defRPr/>
             </a:pPr>
             <a:r>
-              <a:rPr kumimoji="0" lang="fr-FR" sz="1200" b="0" i="0" u="none" strike="noStrike" kern="1200" cap="none" spc="0" normalizeH="0" baseline="0" noProof="0" dirty="0">
-                <a:ln>
-                  <a:noFill/>
-                </a:ln>
-                <a:solidFill>
-                  <a:srgbClr val="4472C4"/>
-                </a:solidFill>
-                <a:effectLst/>
-                <a:uLnTx/>
-                <a:uFillTx/>
-                <a:latin typeface="Calibri" panose="020F0502020204030204"/>
-                <a:ea typeface="+mn-ea"/>
-                <a:cs typeface="+mn-cs"/>
+              <a:rPr lang="fr-FR" sz="1200" dirty="0">
+                <a:solidFill>
+                  <a:srgbClr val="4472C4"/>
+                </a:solidFill>
+                <a:latin typeface="Calibri" panose="020F0502020204030204"/>
               </a:rPr>
               <a:t>- </a:t>
             </a:r>
@@ -5335,6 +5325,55 @@
                 <a:cs typeface="+mn-cs"/>
               </a:rPr>
               <a:t>Sun_Shade</a:t>
+            </a:r>
+            <a:endParaRPr kumimoji="0" lang="fr-FR" sz="1200" b="0" i="0" u="none" strike="noStrike" kern="1200" cap="none" spc="0" normalizeH="0" baseline="0" noProof="0" dirty="0">
+              <a:ln>
+                <a:noFill/>
+              </a:ln>
+              <a:solidFill>
+                <a:srgbClr val="4472C4"/>
+              </a:solidFill>
+              <a:effectLst/>
+              <a:uLnTx/>
+              <a:uFillTx/>
+              <a:latin typeface="Calibri" panose="020F0502020204030204"/>
+              <a:ea typeface="+mn-ea"/>
+              <a:cs typeface="+mn-cs"/>
+            </a:endParaRPr>
+          </a:p>
+          <a:p>
+            <a:pPr marR="0" lvl="0" defTabSz="914400" eaLnBrk="1" fontAlgn="auto" latinLnBrk="0" hangingPunct="1">
+              <a:lnSpc>
+                <a:spcPct val="100000"/>
+              </a:lnSpc>
+              <a:spcBef>
+                <a:spcPts val="0"/>
+              </a:spcBef>
+              <a:spcAft>
+                <a:spcPts val="0"/>
+              </a:spcAft>
+              <a:buClrTx/>
+              <a:buSzTx/>
+              <a:tabLst/>
+              <a:defRPr/>
+            </a:pPr>
+            <a:r>
+              <a:rPr lang="fr-FR" sz="1200" dirty="0">
+                <a:solidFill>
+                  <a:srgbClr val="4472C4"/>
+                </a:solidFill>
+                <a:latin typeface="Calibri" panose="020F0502020204030204"/>
+              </a:rPr>
+              <a:t>- </a:t>
+            </a:r>
+            <a:r>
+              <a:rPr lang="fr-FR" sz="1200">
+                <a:solidFill>
+                  <a:srgbClr val="4472C4"/>
+                </a:solidFill>
+                <a:latin typeface="Calibri" panose="020F0502020204030204"/>
+              </a:rPr>
+              <a:t>Phenological_stage</a:t>
             </a:r>
             <a:endParaRPr kumimoji="0" lang="fr-FR" sz="1200" b="0" i="0" u="none" strike="noStrike" kern="1200" cap="none" spc="0" normalizeH="0" baseline="0" noProof="0" dirty="0">
               <a:ln>

</xml_diff>